<commit_message>
Fix: Atusan Font Updated
- Flags' flag updated too
</commit_message>
<xml_diff>
--- a/@src/Img/Edition/Conlangs' Flags.pptx
+++ b/@src/Img/Edition/Conlangs' Flags.pptx
@@ -274,7 +274,7 @@
           <a:p>
             <a:fld id="{97D07C31-17FD-4282-BE1B-410575909701}" type="datetimeFigureOut">
               <a:rPr lang="es-CL" smtClean="0"/>
-              <a:t>16-02-2023</a:t>
+              <a:t>19-11-2023</a:t>
             </a:fld>
             <a:endParaRPr lang="es-CL"/>
           </a:p>
@@ -474,7 +474,7 @@
           <a:p>
             <a:fld id="{97D07C31-17FD-4282-BE1B-410575909701}" type="datetimeFigureOut">
               <a:rPr lang="es-CL" smtClean="0"/>
-              <a:t>16-02-2023</a:t>
+              <a:t>19-11-2023</a:t>
             </a:fld>
             <a:endParaRPr lang="es-CL"/>
           </a:p>
@@ -684,7 +684,7 @@
           <a:p>
             <a:fld id="{97D07C31-17FD-4282-BE1B-410575909701}" type="datetimeFigureOut">
               <a:rPr lang="es-CL" smtClean="0"/>
-              <a:t>16-02-2023</a:t>
+              <a:t>19-11-2023</a:t>
             </a:fld>
             <a:endParaRPr lang="es-CL"/>
           </a:p>
@@ -884,7 +884,7 @@
           <a:p>
             <a:fld id="{97D07C31-17FD-4282-BE1B-410575909701}" type="datetimeFigureOut">
               <a:rPr lang="es-CL" smtClean="0"/>
-              <a:t>16-02-2023</a:t>
+              <a:t>19-11-2023</a:t>
             </a:fld>
             <a:endParaRPr lang="es-CL"/>
           </a:p>
@@ -1160,7 +1160,7 @@
           <a:p>
             <a:fld id="{97D07C31-17FD-4282-BE1B-410575909701}" type="datetimeFigureOut">
               <a:rPr lang="es-CL" smtClean="0"/>
-              <a:t>16-02-2023</a:t>
+              <a:t>19-11-2023</a:t>
             </a:fld>
             <a:endParaRPr lang="es-CL"/>
           </a:p>
@@ -1428,7 +1428,7 @@
           <a:p>
             <a:fld id="{97D07C31-17FD-4282-BE1B-410575909701}" type="datetimeFigureOut">
               <a:rPr lang="es-CL" smtClean="0"/>
-              <a:t>16-02-2023</a:t>
+              <a:t>19-11-2023</a:t>
             </a:fld>
             <a:endParaRPr lang="es-CL"/>
           </a:p>
@@ -1843,7 +1843,7 @@
           <a:p>
             <a:fld id="{97D07C31-17FD-4282-BE1B-410575909701}" type="datetimeFigureOut">
               <a:rPr lang="es-CL" smtClean="0"/>
-              <a:t>16-02-2023</a:t>
+              <a:t>19-11-2023</a:t>
             </a:fld>
             <a:endParaRPr lang="es-CL"/>
           </a:p>
@@ -1985,7 +1985,7 @@
           <a:p>
             <a:fld id="{97D07C31-17FD-4282-BE1B-410575909701}" type="datetimeFigureOut">
               <a:rPr lang="es-CL" smtClean="0"/>
-              <a:t>16-02-2023</a:t>
+              <a:t>19-11-2023</a:t>
             </a:fld>
             <a:endParaRPr lang="es-CL"/>
           </a:p>
@@ -2098,7 +2098,7 @@
           <a:p>
             <a:fld id="{97D07C31-17FD-4282-BE1B-410575909701}" type="datetimeFigureOut">
               <a:rPr lang="es-CL" smtClean="0"/>
-              <a:t>16-02-2023</a:t>
+              <a:t>19-11-2023</a:t>
             </a:fld>
             <a:endParaRPr lang="es-CL"/>
           </a:p>
@@ -2411,7 +2411,7 @@
           <a:p>
             <a:fld id="{97D07C31-17FD-4282-BE1B-410575909701}" type="datetimeFigureOut">
               <a:rPr lang="es-CL" smtClean="0"/>
-              <a:t>16-02-2023</a:t>
+              <a:t>19-11-2023</a:t>
             </a:fld>
             <a:endParaRPr lang="es-CL"/>
           </a:p>
@@ -2700,7 +2700,7 @@
           <a:p>
             <a:fld id="{97D07C31-17FD-4282-BE1B-410575909701}" type="datetimeFigureOut">
               <a:rPr lang="es-CL" smtClean="0"/>
-              <a:t>16-02-2023</a:t>
+              <a:t>19-11-2023</a:t>
             </a:fld>
             <a:endParaRPr lang="es-CL"/>
           </a:p>
@@ -2943,7 +2943,7 @@
           <a:p>
             <a:fld id="{97D07C31-17FD-4282-BE1B-410575909701}" type="datetimeFigureOut">
               <a:rPr lang="es-CL" smtClean="0"/>
-              <a:t>16-02-2023</a:t>
+              <a:t>19-11-2023</a:t>
             </a:fld>
             <a:endParaRPr lang="es-CL"/>
           </a:p>
@@ -3362,10 +3362,10 @@
       </p:grpSpPr>
       <p:grpSp>
         <p:nvGrpSpPr>
-          <p:cNvPr id="22" name="Grupo 21">
+          <p:cNvPr id="31" name="Grupo 30">
             <a:extLst>
               <a:ext uri="{FF2B5EF4-FFF2-40B4-BE49-F238E27FC236}">
-                <a16:creationId xmlns:a16="http://schemas.microsoft.com/office/drawing/2014/main" id="{CD53B7F4-BFA2-4A87-A60C-A9DD3852DC5F}"/>
+                <a16:creationId xmlns:a16="http://schemas.microsoft.com/office/drawing/2014/main" id="{0BBC77CD-BD37-D3E1-C61A-FC53513A72BE}"/>
               </a:ext>
             </a:extLst>
           </p:cNvPr>
@@ -3374,18 +3374,18 @@
         </p:nvGrpSpPr>
         <p:grpSpPr>
           <a:xfrm>
-            <a:off x="491271" y="591662"/>
-            <a:ext cx="10798794" cy="5400000"/>
-            <a:chOff x="491271" y="591662"/>
-            <a:chExt cx="10798794" cy="5400000"/>
+            <a:off x="568775" y="728999"/>
+            <a:ext cx="10790389" cy="5400001"/>
+            <a:chOff x="568775" y="728999"/>
+            <a:chExt cx="10790389" cy="5400001"/>
           </a:xfrm>
         </p:grpSpPr>
         <p:pic>
           <p:nvPicPr>
-            <p:cNvPr id="3" name="Imagen 2" descr="Una caricatura de una persona&#10;&#10;Descripción generada automáticamente con confianza baja">
+            <p:cNvPr id="7" name="Imagen 6" descr="Icono&#10;&#10;Descripción generada automáticamente">
               <a:extLst>
                 <a:ext uri="{FF2B5EF4-FFF2-40B4-BE49-F238E27FC236}">
-                  <a16:creationId xmlns:a16="http://schemas.microsoft.com/office/drawing/2014/main" id="{EB6CAF17-5213-4258-BFBC-D6858D65B2CA}"/>
+                  <a16:creationId xmlns:a16="http://schemas.microsoft.com/office/drawing/2014/main" id="{6154BE3B-BF21-4259-9368-6F4FC4798A0F}"/>
                 </a:ext>
               </a:extLst>
             </p:cNvPr>
@@ -3408,43 +3408,7 @@
           </p:blipFill>
           <p:spPr>
             <a:xfrm>
-              <a:off x="8586656" y="2391662"/>
-              <a:ext cx="2699615" cy="1800000"/>
-            </a:xfrm>
-            <a:prstGeom prst="rect">
-              <a:avLst/>
-            </a:prstGeom>
-          </p:spPr>
-        </p:pic>
-        <p:pic>
-          <p:nvPicPr>
-            <p:cNvPr id="7" name="Imagen 6" descr="Icono&#10;&#10;Descripción generada automáticamente">
-              <a:extLst>
-                <a:ext uri="{FF2B5EF4-FFF2-40B4-BE49-F238E27FC236}">
-                  <a16:creationId xmlns:a16="http://schemas.microsoft.com/office/drawing/2014/main" id="{6154BE3B-BF21-4259-9368-6F4FC4798A0F}"/>
-                </a:ext>
-              </a:extLst>
-            </p:cNvPr>
-            <p:cNvPicPr>
-              <a:picLocks noChangeAspect="1"/>
-            </p:cNvPicPr>
-            <p:nvPr/>
-          </p:nvPicPr>
-          <p:blipFill>
-            <a:blip r:embed="rId3">
-              <a:extLst>
-                <a:ext uri="{28A0092B-C50C-407E-A947-70E740481C1C}">
-                  <a14:useLocalDpi xmlns:a14="http://schemas.microsoft.com/office/drawing/2010/main" val="0"/>
-                </a:ext>
-              </a:extLst>
-            </a:blip>
-            <a:stretch>
-              <a:fillRect/>
-            </a:stretch>
-          </p:blipFill>
-          <p:spPr>
-            <a:xfrm>
-              <a:off x="8586656" y="591662"/>
+              <a:off x="5959068" y="728999"/>
               <a:ext cx="2699615" cy="1800000"/>
             </a:xfrm>
             <a:prstGeom prst="rect">
@@ -3467,7 +3431,7 @@
             <p:nvPr/>
           </p:nvPicPr>
           <p:blipFill>
-            <a:blip r:embed="rId4">
+            <a:blip r:embed="rId3">
               <a:extLst>
                 <a:ext uri="{28A0092B-C50C-407E-A947-70E740481C1C}">
                   <a14:useLocalDpi xmlns:a14="http://schemas.microsoft.com/office/drawing/2010/main" val="0"/>
@@ -3480,7 +3444,7 @@
           </p:blipFill>
           <p:spPr>
             <a:xfrm>
-              <a:off x="3192085" y="591662"/>
+              <a:off x="8659741" y="728999"/>
               <a:ext cx="2699423" cy="1800000"/>
             </a:xfrm>
             <a:prstGeom prst="rect">
@@ -3503,7 +3467,7 @@
             <p:nvPr/>
           </p:nvPicPr>
           <p:blipFill>
-            <a:blip r:embed="rId5">
+            <a:blip r:embed="rId4">
               <a:extLst>
                 <a:ext uri="{28A0092B-C50C-407E-A947-70E740481C1C}">
                   <a14:useLocalDpi xmlns:a14="http://schemas.microsoft.com/office/drawing/2010/main" val="0"/>
@@ -3516,43 +3480,7 @@
           </p:blipFill>
           <p:spPr>
             <a:xfrm>
-              <a:off x="492470" y="591662"/>
-              <a:ext cx="2699615" cy="1800000"/>
-            </a:xfrm>
-            <a:prstGeom prst="rect">
-              <a:avLst/>
-            </a:prstGeom>
-          </p:spPr>
-        </p:pic>
-        <p:pic>
-          <p:nvPicPr>
-            <p:cNvPr id="13" name="Imagen 12" descr="Icono&#10;&#10;Descripción generada automáticamente">
-              <a:extLst>
-                <a:ext uri="{FF2B5EF4-FFF2-40B4-BE49-F238E27FC236}">
-                  <a16:creationId xmlns:a16="http://schemas.microsoft.com/office/drawing/2014/main" id="{DB0FF48A-7F66-480D-9EF1-C30EEBDD383F}"/>
-                </a:ext>
-              </a:extLst>
-            </p:cNvPr>
-            <p:cNvPicPr>
-              <a:picLocks noChangeAspect="1"/>
-            </p:cNvPicPr>
-            <p:nvPr/>
-          </p:nvPicPr>
-          <p:blipFill>
-            <a:blip r:embed="rId6">
-              <a:extLst>
-                <a:ext uri="{28A0092B-C50C-407E-A947-70E740481C1C}">
-                  <a14:useLocalDpi xmlns:a14="http://schemas.microsoft.com/office/drawing/2010/main" val="0"/>
-                </a:ext>
-              </a:extLst>
-            </a:blip>
-            <a:stretch>
-              <a:fillRect/>
-            </a:stretch>
-          </p:blipFill>
-          <p:spPr>
-            <a:xfrm>
-              <a:off x="5891316" y="2391662"/>
+              <a:off x="8654117" y="2528999"/>
               <a:ext cx="2699615" cy="1800000"/>
             </a:xfrm>
             <a:prstGeom prst="rect">
@@ -3575,7 +3503,7 @@
             <p:nvPr/>
           </p:nvPicPr>
           <p:blipFill>
-            <a:blip r:embed="rId7">
+            <a:blip r:embed="rId5">
               <a:extLst>
                 <a:ext uri="{28A0092B-C50C-407E-A947-70E740481C1C}">
                   <a14:useLocalDpi xmlns:a14="http://schemas.microsoft.com/office/drawing/2010/main" val="0"/>
@@ -3588,151 +3516,7 @@
           </p:blipFill>
           <p:spPr>
             <a:xfrm>
-              <a:off x="5891508" y="591662"/>
-              <a:ext cx="2699615" cy="1800000"/>
-            </a:xfrm>
-            <a:prstGeom prst="rect">
-              <a:avLst/>
-            </a:prstGeom>
-          </p:spPr>
-        </p:pic>
-        <p:pic>
-          <p:nvPicPr>
-            <p:cNvPr id="16" name="Imagen 15" descr="Imagen que contiene Gráfico&#10;&#10;Descripción generada automáticamente">
-              <a:extLst>
-                <a:ext uri="{FF2B5EF4-FFF2-40B4-BE49-F238E27FC236}">
-                  <a16:creationId xmlns:a16="http://schemas.microsoft.com/office/drawing/2014/main" id="{622F5428-9DA0-4238-A7D8-52F3BB7A1FCD}"/>
-                </a:ext>
-              </a:extLst>
-            </p:cNvPr>
-            <p:cNvPicPr>
-              <a:picLocks noChangeAspect="1"/>
-            </p:cNvPicPr>
-            <p:nvPr/>
-          </p:nvPicPr>
-          <p:blipFill>
-            <a:blip r:embed="rId4">
-              <a:extLst>
-                <a:ext uri="{28A0092B-C50C-407E-A947-70E740481C1C}">
-                  <a14:useLocalDpi xmlns:a14="http://schemas.microsoft.com/office/drawing/2010/main" val="0"/>
-                </a:ext>
-              </a:extLst>
-            </a:blip>
-            <a:stretch>
-              <a:fillRect/>
-            </a:stretch>
-          </p:blipFill>
-          <p:spPr>
-            <a:xfrm>
-              <a:off x="8590642" y="4191662"/>
-              <a:ext cx="2699423" cy="1800000"/>
-            </a:xfrm>
-            <a:prstGeom prst="rect">
-              <a:avLst/>
-            </a:prstGeom>
-          </p:spPr>
-        </p:pic>
-        <p:pic>
-          <p:nvPicPr>
-            <p:cNvPr id="17" name="Imagen 16" descr="Icono&#10;&#10;Descripción generada automáticamente">
-              <a:extLst>
-                <a:ext uri="{FF2B5EF4-FFF2-40B4-BE49-F238E27FC236}">
-                  <a16:creationId xmlns:a16="http://schemas.microsoft.com/office/drawing/2014/main" id="{9C098D4F-602E-45BB-B888-03AFBDBFA123}"/>
-                </a:ext>
-              </a:extLst>
-            </p:cNvPr>
-            <p:cNvPicPr>
-              <a:picLocks noChangeAspect="1"/>
-            </p:cNvPicPr>
-            <p:nvPr/>
-          </p:nvPicPr>
-          <p:blipFill>
-            <a:blip r:embed="rId6">
-              <a:extLst>
-                <a:ext uri="{28A0092B-C50C-407E-A947-70E740481C1C}">
-                  <a14:useLocalDpi xmlns:a14="http://schemas.microsoft.com/office/drawing/2010/main" val="0"/>
-                </a:ext>
-              </a:extLst>
-            </a:blip>
-            <a:stretch>
-              <a:fillRect/>
-            </a:stretch>
-          </p:blipFill>
-          <p:spPr>
-            <a:xfrm>
-              <a:off x="492231" y="4191662"/>
-              <a:ext cx="2699615" cy="1800000"/>
-            </a:xfrm>
-            <a:prstGeom prst="rect">
-              <a:avLst/>
-            </a:prstGeom>
-          </p:spPr>
-        </p:pic>
-        <p:pic>
-          <p:nvPicPr>
-            <p:cNvPr id="18" name="Imagen 17" descr="Logotipo&#10;&#10;Descripción generada automáticamente">
-              <a:extLst>
-                <a:ext uri="{FF2B5EF4-FFF2-40B4-BE49-F238E27FC236}">
-                  <a16:creationId xmlns:a16="http://schemas.microsoft.com/office/drawing/2014/main" id="{DE79A543-4003-423A-AB36-240EED78D6F4}"/>
-                </a:ext>
-              </a:extLst>
-            </p:cNvPr>
-            <p:cNvPicPr>
-              <a:picLocks noChangeAspect="1"/>
-            </p:cNvPicPr>
-            <p:nvPr/>
-          </p:nvPicPr>
-          <p:blipFill>
-            <a:blip r:embed="rId5">
-              <a:extLst>
-                <a:ext uri="{28A0092B-C50C-407E-A947-70E740481C1C}">
-                  <a14:useLocalDpi xmlns:a14="http://schemas.microsoft.com/office/drawing/2010/main" val="0"/>
-                </a:ext>
-              </a:extLst>
-            </a:blip>
-            <a:stretch>
-              <a:fillRect/>
-            </a:stretch>
-          </p:blipFill>
-          <p:spPr>
-            <a:xfrm>
-              <a:off x="5890885" y="4191662"/>
-              <a:ext cx="2699615" cy="1800000"/>
-            </a:xfrm>
-            <a:prstGeom prst="rect">
-              <a:avLst/>
-            </a:prstGeom>
-          </p:spPr>
-        </p:pic>
-        <p:pic>
-          <p:nvPicPr>
-            <p:cNvPr id="19" name="Imagen 18" descr="Icono&#10;&#10;Descripción generada automáticamente">
-              <a:extLst>
-                <a:ext uri="{FF2B5EF4-FFF2-40B4-BE49-F238E27FC236}">
-                  <a16:creationId xmlns:a16="http://schemas.microsoft.com/office/drawing/2014/main" id="{86E1BF8D-1727-4C39-9C50-A28FD7CB31E9}"/>
-                </a:ext>
-              </a:extLst>
-            </p:cNvPr>
-            <p:cNvPicPr>
-              <a:picLocks noChangeAspect="1"/>
-            </p:cNvPicPr>
-            <p:nvPr/>
-          </p:nvPicPr>
-          <p:blipFill>
-            <a:blip r:embed="rId3">
-              <a:extLst>
-                <a:ext uri="{28A0092B-C50C-407E-A947-70E740481C1C}">
-                  <a14:useLocalDpi xmlns:a14="http://schemas.microsoft.com/office/drawing/2010/main" val="0"/>
-                </a:ext>
-              </a:extLst>
-            </a:blip>
-            <a:stretch>
-              <a:fillRect/>
-            </a:stretch>
-          </p:blipFill>
-          <p:spPr>
-            <a:xfrm>
-              <a:off x="3190670" y="2391662"/>
+              <a:off x="3276009" y="4328999"/>
               <a:ext cx="2699615" cy="1800000"/>
             </a:xfrm>
             <a:prstGeom prst="rect">
@@ -3755,7 +3539,7 @@
             <p:nvPr/>
           </p:nvPicPr>
           <p:blipFill>
-            <a:blip r:embed="rId2">
+            <a:blip r:embed="rId6">
               <a:extLst>
                 <a:ext uri="{28A0092B-C50C-407E-A947-70E740481C1C}">
                   <a14:useLocalDpi xmlns:a14="http://schemas.microsoft.com/office/drawing/2010/main" val="0"/>
@@ -3768,7 +3552,7 @@
           </p:blipFill>
           <p:spPr>
             <a:xfrm>
-              <a:off x="3190669" y="4191662"/>
+              <a:off x="570098" y="2528999"/>
               <a:ext cx="2699615" cy="1800000"/>
             </a:xfrm>
             <a:prstGeom prst="rect">
@@ -3778,10 +3562,10 @@
         </p:pic>
         <p:pic>
           <p:nvPicPr>
-            <p:cNvPr id="21" name="Imagen 20" descr="Logotipo&#10;&#10;Descripción generada automáticamente">
+            <p:cNvPr id="4" name="Imagen 3" descr="Logotipo&#10;&#10;Descripción generada automáticamente">
               <a:extLst>
                 <a:ext uri="{FF2B5EF4-FFF2-40B4-BE49-F238E27FC236}">
-                  <a16:creationId xmlns:a16="http://schemas.microsoft.com/office/drawing/2014/main" id="{8A2AFEEF-65A2-4D5B-8CC9-E0AC275607F8}"/>
+                  <a16:creationId xmlns:a16="http://schemas.microsoft.com/office/drawing/2014/main" id="{7E989EAA-ED9B-88B6-ACE5-D61C626E6282}"/>
                 </a:ext>
               </a:extLst>
             </p:cNvPr>
@@ -3804,7 +3588,7 @@
           </p:blipFill>
           <p:spPr>
             <a:xfrm>
-              <a:off x="491271" y="2391662"/>
+              <a:off x="568775" y="728999"/>
               <a:ext cx="2699615" cy="1800000"/>
             </a:xfrm>
             <a:prstGeom prst="rect">
@@ -3812,6 +3596,397 @@
             </a:prstGeom>
           </p:spPr>
         </p:pic>
+        <p:pic>
+          <p:nvPicPr>
+            <p:cNvPr id="6" name="Imagen 5" descr="Icono&#10;&#10;Descripción generada automáticamente">
+              <a:extLst>
+                <a:ext uri="{FF2B5EF4-FFF2-40B4-BE49-F238E27FC236}">
+                  <a16:creationId xmlns:a16="http://schemas.microsoft.com/office/drawing/2014/main" id="{59A2B93D-CD30-F1E9-943B-4BD2441A9F83}"/>
+                </a:ext>
+              </a:extLst>
+            </p:cNvPr>
+            <p:cNvPicPr>
+              <a:picLocks noChangeAspect="1"/>
+            </p:cNvPicPr>
+            <p:nvPr/>
+          </p:nvPicPr>
+          <p:blipFill>
+            <a:blip r:embed="rId8">
+              <a:extLst>
+                <a:ext uri="{28A0092B-C50C-407E-A947-70E740481C1C}">
+                  <a14:useLocalDpi xmlns:a14="http://schemas.microsoft.com/office/drawing/2010/main" val="0"/>
+                </a:ext>
+              </a:extLst>
+            </a:blip>
+            <a:stretch>
+              <a:fillRect/>
+            </a:stretch>
+          </p:blipFill>
+          <p:spPr>
+            <a:xfrm>
+              <a:off x="576586" y="4328999"/>
+              <a:ext cx="2699615" cy="1800000"/>
+            </a:xfrm>
+            <a:prstGeom prst="rect">
+              <a:avLst/>
+            </a:prstGeom>
+          </p:spPr>
+        </p:pic>
+        <p:pic>
+          <p:nvPicPr>
+            <p:cNvPr id="10" name="Imagen 9" descr="Logotipo&#10;&#10;Descripción generada automáticamente">
+              <a:extLst>
+                <a:ext uri="{FF2B5EF4-FFF2-40B4-BE49-F238E27FC236}">
+                  <a16:creationId xmlns:a16="http://schemas.microsoft.com/office/drawing/2014/main" id="{AA5A60B9-309E-BCA2-766E-07F0E5715A2A}"/>
+                </a:ext>
+              </a:extLst>
+            </p:cNvPr>
+            <p:cNvPicPr>
+              <a:picLocks noChangeAspect="1"/>
+            </p:cNvPicPr>
+            <p:nvPr/>
+          </p:nvPicPr>
+          <p:blipFill>
+            <a:blip r:embed="rId9">
+              <a:extLst>
+                <a:ext uri="{28A0092B-C50C-407E-A947-70E740481C1C}">
+                  <a14:useLocalDpi xmlns:a14="http://schemas.microsoft.com/office/drawing/2010/main" val="0"/>
+                </a:ext>
+              </a:extLst>
+            </a:blip>
+            <a:stretch>
+              <a:fillRect/>
+            </a:stretch>
+          </p:blipFill>
+          <p:spPr>
+            <a:xfrm>
+              <a:off x="3265146" y="728999"/>
+              <a:ext cx="2699616" cy="1800000"/>
+            </a:xfrm>
+            <a:prstGeom prst="rect">
+              <a:avLst/>
+            </a:prstGeom>
+          </p:spPr>
+        </p:pic>
+        <p:pic>
+          <p:nvPicPr>
+            <p:cNvPr id="14" name="Imagen 13" descr="Icono&#10;&#10;Descripción generada automáticamente">
+              <a:extLst>
+                <a:ext uri="{FF2B5EF4-FFF2-40B4-BE49-F238E27FC236}">
+                  <a16:creationId xmlns:a16="http://schemas.microsoft.com/office/drawing/2014/main" id="{164AA423-698C-B1E6-F1AE-52D4606B2379}"/>
+                </a:ext>
+              </a:extLst>
+            </p:cNvPr>
+            <p:cNvPicPr>
+              <a:picLocks noChangeAspect="1"/>
+            </p:cNvPicPr>
+            <p:nvPr/>
+          </p:nvPicPr>
+          <p:blipFill>
+            <a:blip r:embed="rId10">
+              <a:extLst>
+                <a:ext uri="{28A0092B-C50C-407E-A947-70E740481C1C}">
+                  <a14:useLocalDpi xmlns:a14="http://schemas.microsoft.com/office/drawing/2010/main" val="0"/>
+                </a:ext>
+              </a:extLst>
+            </a:blip>
+            <a:stretch>
+              <a:fillRect/>
+            </a:stretch>
+          </p:blipFill>
+          <p:spPr>
+            <a:xfrm>
+              <a:off x="3265941" y="2528999"/>
+              <a:ext cx="2699615" cy="1800000"/>
+            </a:xfrm>
+            <a:prstGeom prst="rect">
+              <a:avLst/>
+            </a:prstGeom>
+          </p:spPr>
+        </p:pic>
+        <p:pic>
+          <p:nvPicPr>
+            <p:cNvPr id="24" name="Imagen 23" descr="Un dibujo de una persona&#10;&#10;Descripción generada automáticamente con confianza baja">
+              <a:extLst>
+                <a:ext uri="{FF2B5EF4-FFF2-40B4-BE49-F238E27FC236}">
+                  <a16:creationId xmlns:a16="http://schemas.microsoft.com/office/drawing/2014/main" id="{0FF718E1-0A55-0A4E-C8A9-EBC53695D663}"/>
+                </a:ext>
+              </a:extLst>
+            </p:cNvPr>
+            <p:cNvPicPr>
+              <a:picLocks noChangeAspect="1"/>
+            </p:cNvPicPr>
+            <p:nvPr/>
+          </p:nvPicPr>
+          <p:blipFill>
+            <a:blip r:embed="rId11">
+              <a:extLst>
+                <a:ext uri="{28A0092B-C50C-407E-A947-70E740481C1C}">
+                  <a14:useLocalDpi xmlns:a14="http://schemas.microsoft.com/office/drawing/2010/main" val="0"/>
+                </a:ext>
+              </a:extLst>
+            </a:blip>
+            <a:stretch>
+              <a:fillRect/>
+            </a:stretch>
+          </p:blipFill>
+          <p:spPr>
+            <a:xfrm>
+              <a:off x="5965556" y="2528999"/>
+              <a:ext cx="2699616" cy="1800001"/>
+            </a:xfrm>
+            <a:prstGeom prst="rect">
+              <a:avLst/>
+            </a:prstGeom>
+          </p:spPr>
+        </p:pic>
+        <p:pic>
+          <p:nvPicPr>
+            <p:cNvPr id="26" name="Imagen 25" descr="Icono&#10;&#10;Descripción generada automáticamente">
+              <a:extLst>
+                <a:ext uri="{FF2B5EF4-FFF2-40B4-BE49-F238E27FC236}">
+                  <a16:creationId xmlns:a16="http://schemas.microsoft.com/office/drawing/2014/main" id="{136A43BE-6D1B-80B2-E2F3-B34776E07563}"/>
+                </a:ext>
+              </a:extLst>
+            </p:cNvPr>
+            <p:cNvPicPr>
+              <a:picLocks noChangeAspect="1"/>
+            </p:cNvPicPr>
+            <p:nvPr/>
+          </p:nvPicPr>
+          <p:blipFill>
+            <a:blip r:embed="rId12">
+              <a:extLst>
+                <a:ext uri="{28A0092B-C50C-407E-A947-70E740481C1C}">
+                  <a14:useLocalDpi xmlns:a14="http://schemas.microsoft.com/office/drawing/2010/main" val="0"/>
+                </a:ext>
+              </a:extLst>
+            </a:blip>
+            <a:stretch>
+              <a:fillRect/>
+            </a:stretch>
+          </p:blipFill>
+          <p:spPr>
+            <a:xfrm>
+              <a:off x="5965556" y="4329000"/>
+              <a:ext cx="2699615" cy="1800000"/>
+            </a:xfrm>
+            <a:prstGeom prst="rect">
+              <a:avLst/>
+            </a:prstGeom>
+          </p:spPr>
+        </p:pic>
+        <p:sp>
+          <p:nvSpPr>
+            <p:cNvPr id="27" name="Rectángulo 26">
+              <a:extLst>
+                <a:ext uri="{FF2B5EF4-FFF2-40B4-BE49-F238E27FC236}">
+                  <a16:creationId xmlns:a16="http://schemas.microsoft.com/office/drawing/2014/main" id="{5B907BB2-1BDA-855B-12E3-16CC6A538E61}"/>
+                </a:ext>
+              </a:extLst>
+            </p:cNvPr>
+            <p:cNvSpPr/>
+            <p:nvPr/>
+          </p:nvSpPr>
+          <p:spPr>
+            <a:xfrm>
+              <a:off x="8654911" y="4328999"/>
+              <a:ext cx="2698821" cy="1800000"/>
+            </a:xfrm>
+            <a:prstGeom prst="rect">
+              <a:avLst/>
+            </a:prstGeom>
+            <a:solidFill>
+              <a:schemeClr val="bg1"/>
+            </a:solidFill>
+            <a:ln>
+              <a:noFill/>
+            </a:ln>
+          </p:spPr>
+          <p:style>
+            <a:lnRef idx="2">
+              <a:schemeClr val="accent1">
+                <a:shade val="50000"/>
+              </a:schemeClr>
+            </a:lnRef>
+            <a:fillRef idx="1">
+              <a:schemeClr val="accent1"/>
+            </a:fillRef>
+            <a:effectRef idx="0">
+              <a:schemeClr val="accent1"/>
+            </a:effectRef>
+            <a:fontRef idx="minor">
+              <a:schemeClr val="lt1"/>
+            </a:fontRef>
+          </p:style>
+          <p:txBody>
+            <a:bodyPr rtlCol="0" anchor="ctr"/>
+            <a:lstStyle/>
+            <a:p>
+              <a:pPr algn="ctr"/>
+              <a:r>
+                <a:rPr lang="es-CL" dirty="0"/>
+                <a:t>.</a:t>
+              </a:r>
+            </a:p>
+          </p:txBody>
+        </p:sp>
+        <p:sp>
+          <p:nvSpPr>
+            <p:cNvPr id="28" name="Elipse 27">
+              <a:extLst>
+                <a:ext uri="{FF2B5EF4-FFF2-40B4-BE49-F238E27FC236}">
+                  <a16:creationId xmlns:a16="http://schemas.microsoft.com/office/drawing/2014/main" id="{A4F5C35F-D8BF-0405-4376-A67079C2F408}"/>
+                </a:ext>
+              </a:extLst>
+            </p:cNvPr>
+            <p:cNvSpPr/>
+            <p:nvPr/>
+          </p:nvSpPr>
+          <p:spPr>
+            <a:xfrm>
+              <a:off x="9428560" y="5084999"/>
+              <a:ext cx="288000" cy="288000"/>
+            </a:xfrm>
+            <a:prstGeom prst="ellipse">
+              <a:avLst/>
+            </a:prstGeom>
+            <a:solidFill>
+              <a:schemeClr val="tx1"/>
+            </a:solidFill>
+            <a:ln>
+              <a:noFill/>
+            </a:ln>
+          </p:spPr>
+          <p:style>
+            <a:lnRef idx="2">
+              <a:schemeClr val="accent1">
+                <a:shade val="50000"/>
+              </a:schemeClr>
+            </a:lnRef>
+            <a:fillRef idx="1">
+              <a:schemeClr val="accent1"/>
+            </a:fillRef>
+            <a:effectRef idx="0">
+              <a:schemeClr val="accent1"/>
+            </a:effectRef>
+            <a:fontRef idx="minor">
+              <a:schemeClr val="lt1"/>
+            </a:fontRef>
+          </p:style>
+          <p:txBody>
+            <a:bodyPr rtlCol="0" anchor="ctr"/>
+            <a:lstStyle/>
+            <a:p>
+              <a:pPr algn="ctr"/>
+              <a:endParaRPr lang="es-CL"/>
+            </a:p>
+          </p:txBody>
+        </p:sp>
+        <p:sp>
+          <p:nvSpPr>
+            <p:cNvPr id="29" name="Elipse 28">
+              <a:extLst>
+                <a:ext uri="{FF2B5EF4-FFF2-40B4-BE49-F238E27FC236}">
+                  <a16:creationId xmlns:a16="http://schemas.microsoft.com/office/drawing/2014/main" id="{C751D136-22A3-35F6-37BA-E39169768986}"/>
+                </a:ext>
+              </a:extLst>
+            </p:cNvPr>
+            <p:cNvSpPr/>
+            <p:nvPr/>
+          </p:nvSpPr>
+          <p:spPr>
+            <a:xfrm>
+              <a:off x="9865451" y="5084999"/>
+              <a:ext cx="288000" cy="288000"/>
+            </a:xfrm>
+            <a:prstGeom prst="ellipse">
+              <a:avLst/>
+            </a:prstGeom>
+            <a:solidFill>
+              <a:schemeClr val="tx1"/>
+            </a:solidFill>
+            <a:ln>
+              <a:noFill/>
+            </a:ln>
+          </p:spPr>
+          <p:style>
+            <a:lnRef idx="2">
+              <a:schemeClr val="accent1">
+                <a:shade val="50000"/>
+              </a:schemeClr>
+            </a:lnRef>
+            <a:fillRef idx="1">
+              <a:schemeClr val="accent1"/>
+            </a:fillRef>
+            <a:effectRef idx="0">
+              <a:schemeClr val="accent1"/>
+            </a:effectRef>
+            <a:fontRef idx="minor">
+              <a:schemeClr val="lt1"/>
+            </a:fontRef>
+          </p:style>
+          <p:txBody>
+            <a:bodyPr rtlCol="0" anchor="ctr"/>
+            <a:lstStyle/>
+            <a:p>
+              <a:pPr algn="ctr"/>
+              <a:endParaRPr lang="es-CL"/>
+            </a:p>
+          </p:txBody>
+        </p:sp>
+        <p:sp>
+          <p:nvSpPr>
+            <p:cNvPr id="30" name="Elipse 29">
+              <a:extLst>
+                <a:ext uri="{FF2B5EF4-FFF2-40B4-BE49-F238E27FC236}">
+                  <a16:creationId xmlns:a16="http://schemas.microsoft.com/office/drawing/2014/main" id="{43052553-DAFA-0890-BD62-7A7381EEAC5F}"/>
+                </a:ext>
+              </a:extLst>
+            </p:cNvPr>
+            <p:cNvSpPr/>
+            <p:nvPr/>
+          </p:nvSpPr>
+          <p:spPr>
+            <a:xfrm>
+              <a:off x="10302342" y="5084999"/>
+              <a:ext cx="288000" cy="288000"/>
+            </a:xfrm>
+            <a:prstGeom prst="ellipse">
+              <a:avLst/>
+            </a:prstGeom>
+            <a:solidFill>
+              <a:schemeClr val="tx1"/>
+            </a:solidFill>
+            <a:ln>
+              <a:noFill/>
+            </a:ln>
+          </p:spPr>
+          <p:style>
+            <a:lnRef idx="2">
+              <a:schemeClr val="accent1">
+                <a:shade val="50000"/>
+              </a:schemeClr>
+            </a:lnRef>
+            <a:fillRef idx="1">
+              <a:schemeClr val="accent1"/>
+            </a:fillRef>
+            <a:effectRef idx="0">
+              <a:schemeClr val="accent1"/>
+            </a:effectRef>
+            <a:fontRef idx="minor">
+              <a:schemeClr val="lt1"/>
+            </a:fontRef>
+          </p:style>
+          <p:txBody>
+            <a:bodyPr rtlCol="0" anchor="ctr"/>
+            <a:lstStyle/>
+            <a:p>
+              <a:pPr algn="ctr"/>
+              <a:endParaRPr lang="es-CL"/>
+            </a:p>
+          </p:txBody>
+        </p:sp>
       </p:grpSp>
     </p:spTree>
     <p:extLst>

</xml_diff>